<commit_message>
Segmentation code plus small other changes
-Added a code for Nucleus Segmentation.
-Added 2 images to midway ppt
-Added the paper on LeNet Algorithm
</commit_message>
<xml_diff>
--- a/Presentation/Project Midway.pptx
+++ b/Presentation/Project Midway.pptx
@@ -310,7 +310,7 @@
           <a:p>
             <a:fld id="{C945DEE4-5232-4DB1-8F51-4D6A83D24E79}" type="datetimeFigureOut">
               <a:rPr lang="en-IN" smtClean="0"/>
-              <a:t>17-10-2021</a:t>
+              <a:t>27-10-2021</a:t>
             </a:fld>
             <a:endParaRPr lang="en-IN"/>
           </a:p>
@@ -648,7 +648,7 @@
           <a:p>
             <a:fld id="{C945DEE4-5232-4DB1-8F51-4D6A83D24E79}" type="datetimeFigureOut">
               <a:rPr lang="en-IN" smtClean="0"/>
-              <a:t>17-10-2021</a:t>
+              <a:t>27-10-2021</a:t>
             </a:fld>
             <a:endParaRPr lang="en-IN"/>
           </a:p>
@@ -1049,7 +1049,7 @@
           <a:p>
             <a:fld id="{C945DEE4-5232-4DB1-8F51-4D6A83D24E79}" type="datetimeFigureOut">
               <a:rPr lang="en-IN" smtClean="0"/>
-              <a:t>17-10-2021</a:t>
+              <a:t>27-10-2021</a:t>
             </a:fld>
             <a:endParaRPr lang="en-IN"/>
           </a:p>
@@ -1385,7 +1385,7 @@
           <a:p>
             <a:fld id="{C945DEE4-5232-4DB1-8F51-4D6A83D24E79}" type="datetimeFigureOut">
               <a:rPr lang="en-IN" smtClean="0"/>
-              <a:t>17-10-2021</a:t>
+              <a:t>27-10-2021</a:t>
             </a:fld>
             <a:endParaRPr lang="en-IN"/>
           </a:p>
@@ -1705,7 +1705,7 @@
           <a:p>
             <a:fld id="{C945DEE4-5232-4DB1-8F51-4D6A83D24E79}" type="datetimeFigureOut">
               <a:rPr lang="en-IN" smtClean="0"/>
-              <a:t>17-10-2021</a:t>
+              <a:t>27-10-2021</a:t>
             </a:fld>
             <a:endParaRPr lang="en-IN"/>
           </a:p>
@@ -2101,7 +2101,7 @@
           <a:p>
             <a:fld id="{C945DEE4-5232-4DB1-8F51-4D6A83D24E79}" type="datetimeFigureOut">
               <a:rPr lang="en-IN" smtClean="0"/>
-              <a:t>17-10-2021</a:t>
+              <a:t>27-10-2021</a:t>
             </a:fld>
             <a:endParaRPr lang="en-IN"/>
           </a:p>
@@ -2358,7 +2358,7 @@
           <a:p>
             <a:fld id="{C945DEE4-5232-4DB1-8F51-4D6A83D24E79}" type="datetimeFigureOut">
               <a:rPr lang="en-IN" smtClean="0"/>
-              <a:t>17-10-2021</a:t>
+              <a:t>27-10-2021</a:t>
             </a:fld>
             <a:endParaRPr lang="en-IN"/>
           </a:p>
@@ -2620,7 +2620,7 @@
           <a:p>
             <a:fld id="{C945DEE4-5232-4DB1-8F51-4D6A83D24E79}" type="datetimeFigureOut">
               <a:rPr lang="en-IN" smtClean="0"/>
-              <a:t>17-10-2021</a:t>
+              <a:t>27-10-2021</a:t>
             </a:fld>
             <a:endParaRPr lang="en-IN"/>
           </a:p>
@@ -2882,7 +2882,7 @@
           <a:p>
             <a:fld id="{C945DEE4-5232-4DB1-8F51-4D6A83D24E79}" type="datetimeFigureOut">
               <a:rPr lang="en-IN" smtClean="0"/>
-              <a:t>17-10-2021</a:t>
+              <a:t>27-10-2021</a:t>
             </a:fld>
             <a:endParaRPr lang="en-IN"/>
           </a:p>
@@ -3211,7 +3211,7 @@
           <a:p>
             <a:fld id="{C945DEE4-5232-4DB1-8F51-4D6A83D24E79}" type="datetimeFigureOut">
               <a:rPr lang="en-IN" smtClean="0"/>
-              <a:t>17-10-2021</a:t>
+              <a:t>27-10-2021</a:t>
             </a:fld>
             <a:endParaRPr lang="en-IN"/>
           </a:p>
@@ -3534,7 +3534,7 @@
           <a:p>
             <a:fld id="{C945DEE4-5232-4DB1-8F51-4D6A83D24E79}" type="datetimeFigureOut">
               <a:rPr lang="en-IN" smtClean="0"/>
-              <a:t>17-10-2021</a:t>
+              <a:t>27-10-2021</a:t>
             </a:fld>
             <a:endParaRPr lang="en-IN"/>
           </a:p>
@@ -3991,7 +3991,7 @@
           <a:p>
             <a:fld id="{C945DEE4-5232-4DB1-8F51-4D6A83D24E79}" type="datetimeFigureOut">
               <a:rPr lang="en-IN" smtClean="0"/>
-              <a:t>17-10-2021</a:t>
+              <a:t>27-10-2021</a:t>
             </a:fld>
             <a:endParaRPr lang="en-IN"/>
           </a:p>
@@ -4196,7 +4196,7 @@
           <a:p>
             <a:fld id="{C945DEE4-5232-4DB1-8F51-4D6A83D24E79}" type="datetimeFigureOut">
               <a:rPr lang="en-IN" smtClean="0"/>
-              <a:t>17-10-2021</a:t>
+              <a:t>27-10-2021</a:t>
             </a:fld>
             <a:endParaRPr lang="en-IN"/>
           </a:p>
@@ -4373,7 +4373,7 @@
           <a:p>
             <a:fld id="{C945DEE4-5232-4DB1-8F51-4D6A83D24E79}" type="datetimeFigureOut">
               <a:rPr lang="en-IN" smtClean="0"/>
-              <a:t>17-10-2021</a:t>
+              <a:t>27-10-2021</a:t>
             </a:fld>
             <a:endParaRPr lang="en-IN"/>
           </a:p>
@@ -4706,7 +4706,7 @@
           <a:p>
             <a:fld id="{C945DEE4-5232-4DB1-8F51-4D6A83D24E79}" type="datetimeFigureOut">
               <a:rPr lang="en-IN" smtClean="0"/>
-              <a:t>17-10-2021</a:t>
+              <a:t>27-10-2021</a:t>
             </a:fld>
             <a:endParaRPr lang="en-IN"/>
           </a:p>
@@ -5051,7 +5051,7 @@
           <a:p>
             <a:fld id="{C945DEE4-5232-4DB1-8F51-4D6A83D24E79}" type="datetimeFigureOut">
               <a:rPr lang="en-IN" smtClean="0"/>
-              <a:t>17-10-2021</a:t>
+              <a:t>27-10-2021</a:t>
             </a:fld>
             <a:endParaRPr lang="en-IN"/>
           </a:p>
@@ -7168,7 +7168,7 @@
           <a:p>
             <a:fld id="{C945DEE4-5232-4DB1-8F51-4D6A83D24E79}" type="datetimeFigureOut">
               <a:rPr lang="en-IN" smtClean="0"/>
-              <a:t>17-10-2021</a:t>
+              <a:t>27-10-2021</a:t>
             </a:fld>
             <a:endParaRPr lang="en-IN"/>
           </a:p>
@@ -11416,7 +11416,7 @@
         </p:nvSpPr>
         <p:spPr>
           <a:xfrm>
-            <a:off x="2582547" y="625151"/>
+            <a:off x="2582547" y="156637"/>
             <a:ext cx="8911687" cy="1280890"/>
           </a:xfrm>
         </p:spPr>
@@ -11450,7 +11450,7 @@
         </p:nvSpPr>
         <p:spPr>
           <a:xfrm>
-            <a:off x="2647862" y="2249904"/>
+            <a:off x="2578834" y="1046910"/>
             <a:ext cx="8915400" cy="3982945"/>
           </a:xfrm>
         </p:spPr>

</xml_diff>